<commit_message>
Completed presentation and uploaded in both Powerpoint and PDF formats.
</commit_message>
<xml_diff>
--- a/presentation.pptx
+++ b/presentation.pptx
@@ -10,7 +10,9 @@
     <p:sldId id="258" r:id="rId4"/>
     <p:sldId id="260" r:id="rId5"/>
     <p:sldId id="261" r:id="rId6"/>
-    <p:sldId id="259" r:id="rId7"/>
+    <p:sldId id="262" r:id="rId7"/>
+    <p:sldId id="263" r:id="rId8"/>
+    <p:sldId id="259" r:id="rId9"/>
   </p:sldIdLst>
   <p:sldSz cx="12192000" cy="6858000"/>
   <p:notesSz cx="6858000" cy="9144000"/>
@@ -109,6 +111,11 @@
       </a:defRPr>
     </a:lvl9pPr>
   </p:defaultTextStyle>
+  <p:extLst>
+    <p:ext uri="{EFAFB233-063F-42B5-8137-9DF3F51BA10A}">
+      <p15:sldGuideLst xmlns:p15="http://schemas.microsoft.com/office/powerpoint/2012/main"/>
+    </p:ext>
+  </p:extLst>
 </p:presentation>
 </file>
 
@@ -242,7 +249,7 @@
           </a:lstStyle>
           <a:p>
             <a:r>
-              <a:rPr lang="en-US" smtClean="0"/>
+              <a:rPr lang="en-US"/>
               <a:t>Click to edit Master title style</a:t>
             </a:r>
             <a:endParaRPr lang="en-US" dirty="0"/>
@@ -314,7 +321,7 @@
           </a:lstStyle>
           <a:p>
             <a:r>
-              <a:rPr lang="en-US" smtClean="0"/>
+              <a:rPr lang="en-US"/>
               <a:t>Click to edit Master subtitle style</a:t>
             </a:r>
             <a:endParaRPr lang="en-US" dirty="0"/>
@@ -338,7 +345,7 @@
           <a:p>
             <a:fld id="{900C6341-308B-40BC-9484-0279FE10EE7E}" type="datetimeFigureOut">
               <a:rPr lang="en-US" smtClean="0"/>
-              <a:t>3/20/2019</a:t>
+              <a:t>3/20/19</a:t>
             </a:fld>
             <a:endParaRPr lang="en-US"/>
           </a:p>
@@ -470,7 +477,7 @@
           <a:lstStyle/>
           <a:p>
             <a:r>
-              <a:rPr lang="en-US" smtClean="0"/>
+              <a:rPr lang="en-US"/>
               <a:t>Click to edit Master title style</a:t>
             </a:r>
             <a:endParaRPr lang="en-US" dirty="0"/>
@@ -494,35 +501,35 @@
           <a:p>
             <a:pPr lvl="0"/>
             <a:r>
-              <a:rPr lang="en-US" smtClean="0"/>
+              <a:rPr lang="en-US"/>
               <a:t>Click to edit Master text styles</a:t>
             </a:r>
           </a:p>
           <a:p>
             <a:pPr lvl="1"/>
             <a:r>
-              <a:rPr lang="en-US" smtClean="0"/>
+              <a:rPr lang="en-US"/>
               <a:t>Second level</a:t>
             </a:r>
           </a:p>
           <a:p>
             <a:pPr lvl="2"/>
             <a:r>
-              <a:rPr lang="en-US" smtClean="0"/>
+              <a:rPr lang="en-US"/>
               <a:t>Third level</a:t>
             </a:r>
           </a:p>
           <a:p>
             <a:pPr lvl="3"/>
             <a:r>
-              <a:rPr lang="en-US" smtClean="0"/>
+              <a:rPr lang="en-US"/>
               <a:t>Fourth level</a:t>
             </a:r>
           </a:p>
           <a:p>
             <a:pPr lvl="4"/>
             <a:r>
-              <a:rPr lang="en-US" smtClean="0"/>
+              <a:rPr lang="en-US"/>
               <a:t>Fifth level</a:t>
             </a:r>
             <a:endParaRPr lang="en-US" dirty="0"/>
@@ -546,7 +553,7 @@
           <a:p>
             <a:fld id="{900C6341-308B-40BC-9484-0279FE10EE7E}" type="datetimeFigureOut">
               <a:rPr lang="en-US" smtClean="0"/>
-              <a:t>3/20/2019</a:t>
+              <a:t>3/20/19</a:t>
             </a:fld>
             <a:endParaRPr lang="en-US"/>
           </a:p>
@@ -721,7 +728,7 @@
           <a:lstStyle/>
           <a:p>
             <a:r>
-              <a:rPr lang="en-US" smtClean="0"/>
+              <a:rPr lang="en-US"/>
               <a:t>Click to edit Master title style</a:t>
             </a:r>
             <a:endParaRPr lang="en-US" dirty="0"/>
@@ -750,35 +757,35 @@
           <a:p>
             <a:pPr lvl="0"/>
             <a:r>
-              <a:rPr lang="en-US" smtClean="0"/>
+              <a:rPr lang="en-US"/>
               <a:t>Click to edit Master text styles</a:t>
             </a:r>
           </a:p>
           <a:p>
             <a:pPr lvl="1"/>
             <a:r>
-              <a:rPr lang="en-US" smtClean="0"/>
+              <a:rPr lang="en-US"/>
               <a:t>Second level</a:t>
             </a:r>
           </a:p>
           <a:p>
             <a:pPr lvl="2"/>
             <a:r>
-              <a:rPr lang="en-US" smtClean="0"/>
+              <a:rPr lang="en-US"/>
               <a:t>Third level</a:t>
             </a:r>
           </a:p>
           <a:p>
             <a:pPr lvl="3"/>
             <a:r>
-              <a:rPr lang="en-US" smtClean="0"/>
+              <a:rPr lang="en-US"/>
               <a:t>Fourth level</a:t>
             </a:r>
           </a:p>
           <a:p>
             <a:pPr lvl="4"/>
             <a:r>
-              <a:rPr lang="en-US" smtClean="0"/>
+              <a:rPr lang="en-US"/>
               <a:t>Fifth level</a:t>
             </a:r>
             <a:endParaRPr lang="en-US" dirty="0"/>
@@ -802,7 +809,7 @@
           <a:p>
             <a:fld id="{900C6341-308B-40BC-9484-0279FE10EE7E}" type="datetimeFigureOut">
               <a:rPr lang="en-US" smtClean="0"/>
-              <a:t>3/20/2019</a:t>
+              <a:t>3/20/19</a:t>
             </a:fld>
             <a:endParaRPr lang="en-US"/>
           </a:p>
@@ -896,7 +903,7 @@
           <a:lstStyle/>
           <a:p>
             <a:r>
-              <a:rPr lang="en-US" smtClean="0"/>
+              <a:rPr lang="en-US"/>
               <a:t>Click to edit Master title style</a:t>
             </a:r>
             <a:endParaRPr lang="en-US" dirty="0"/>
@@ -920,35 +927,35 @@
           <a:p>
             <a:pPr lvl="0"/>
             <a:r>
-              <a:rPr lang="en-US" smtClean="0"/>
+              <a:rPr lang="en-US"/>
               <a:t>Click to edit Master text styles</a:t>
             </a:r>
           </a:p>
           <a:p>
             <a:pPr lvl="1"/>
             <a:r>
-              <a:rPr lang="en-US" smtClean="0"/>
+              <a:rPr lang="en-US"/>
               <a:t>Second level</a:t>
             </a:r>
           </a:p>
           <a:p>
             <a:pPr lvl="2"/>
             <a:r>
-              <a:rPr lang="en-US" smtClean="0"/>
+              <a:rPr lang="en-US"/>
               <a:t>Third level</a:t>
             </a:r>
           </a:p>
           <a:p>
             <a:pPr lvl="3"/>
             <a:r>
-              <a:rPr lang="en-US" smtClean="0"/>
+              <a:rPr lang="en-US"/>
               <a:t>Fourth level</a:t>
             </a:r>
           </a:p>
           <a:p>
             <a:pPr lvl="4"/>
             <a:r>
-              <a:rPr lang="en-US" smtClean="0"/>
+              <a:rPr lang="en-US"/>
               <a:t>Fifth level</a:t>
             </a:r>
             <a:endParaRPr lang="en-US" dirty="0"/>
@@ -972,7 +979,7 @@
           <a:p>
             <a:fld id="{900C6341-308B-40BC-9484-0279FE10EE7E}" type="datetimeFigureOut">
               <a:rPr lang="en-US" smtClean="0"/>
-              <a:t>3/20/2019</a:t>
+              <a:t>3/20/19</a:t>
             </a:fld>
             <a:endParaRPr lang="en-US"/>
           </a:p>
@@ -1171,7 +1178,7 @@
           </a:lstStyle>
           <a:p>
             <a:r>
-              <a:rPr lang="en-US" smtClean="0"/>
+              <a:rPr lang="en-US"/>
               <a:t>Click to edit Master title style</a:t>
             </a:r>
             <a:endParaRPr lang="en-US" dirty="0"/>
@@ -1292,7 +1299,7 @@
           <a:p>
             <a:pPr lvl="0"/>
             <a:r>
-              <a:rPr lang="en-US" smtClean="0"/>
+              <a:rPr lang="en-US"/>
               <a:t>Click to edit Master text styles</a:t>
             </a:r>
           </a:p>
@@ -1315,7 +1322,7 @@
           <a:p>
             <a:fld id="{900C6341-308B-40BC-9484-0279FE10EE7E}" type="datetimeFigureOut">
               <a:rPr lang="en-US" smtClean="0"/>
-              <a:t>3/20/2019</a:t>
+              <a:t>3/20/19</a:t>
             </a:fld>
             <a:endParaRPr lang="en-US"/>
           </a:p>
@@ -1452,7 +1459,7 @@
           <a:lstStyle/>
           <a:p>
             <a:r>
-              <a:rPr lang="en-US" smtClean="0"/>
+              <a:rPr lang="en-US"/>
               <a:t>Click to edit Master title style</a:t>
             </a:r>
             <a:endParaRPr lang="en-US" dirty="0"/>
@@ -1481,35 +1488,35 @@
           <a:p>
             <a:pPr lvl="0"/>
             <a:r>
-              <a:rPr lang="en-US" smtClean="0"/>
+              <a:rPr lang="en-US"/>
               <a:t>Click to edit Master text styles</a:t>
             </a:r>
           </a:p>
           <a:p>
             <a:pPr lvl="1"/>
             <a:r>
-              <a:rPr lang="en-US" smtClean="0"/>
+              <a:rPr lang="en-US"/>
               <a:t>Second level</a:t>
             </a:r>
           </a:p>
           <a:p>
             <a:pPr lvl="2"/>
             <a:r>
-              <a:rPr lang="en-US" smtClean="0"/>
+              <a:rPr lang="en-US"/>
               <a:t>Third level</a:t>
             </a:r>
           </a:p>
           <a:p>
             <a:pPr lvl="3"/>
             <a:r>
-              <a:rPr lang="en-US" smtClean="0"/>
+              <a:rPr lang="en-US"/>
               <a:t>Fourth level</a:t>
             </a:r>
           </a:p>
           <a:p>
             <a:pPr lvl="4"/>
             <a:r>
-              <a:rPr lang="en-US" smtClean="0"/>
+              <a:rPr lang="en-US"/>
               <a:t>Fifth level</a:t>
             </a:r>
             <a:endParaRPr lang="en-US" dirty="0"/>
@@ -1538,35 +1545,35 @@
           <a:p>
             <a:pPr lvl="0"/>
             <a:r>
-              <a:rPr lang="en-US" smtClean="0"/>
+              <a:rPr lang="en-US"/>
               <a:t>Click to edit Master text styles</a:t>
             </a:r>
           </a:p>
           <a:p>
             <a:pPr lvl="1"/>
             <a:r>
-              <a:rPr lang="en-US" smtClean="0"/>
+              <a:rPr lang="en-US"/>
               <a:t>Second level</a:t>
             </a:r>
           </a:p>
           <a:p>
             <a:pPr lvl="2"/>
             <a:r>
-              <a:rPr lang="en-US" smtClean="0"/>
+              <a:rPr lang="en-US"/>
               <a:t>Third level</a:t>
             </a:r>
           </a:p>
           <a:p>
             <a:pPr lvl="3"/>
             <a:r>
-              <a:rPr lang="en-US" smtClean="0"/>
+              <a:rPr lang="en-US"/>
               <a:t>Fourth level</a:t>
             </a:r>
           </a:p>
           <a:p>
             <a:pPr lvl="4"/>
             <a:r>
-              <a:rPr lang="en-US" smtClean="0"/>
+              <a:rPr lang="en-US"/>
               <a:t>Fifth level</a:t>
             </a:r>
             <a:endParaRPr lang="en-US" dirty="0"/>
@@ -1590,7 +1597,7 @@
           <a:p>
             <a:fld id="{900C6341-308B-40BC-9484-0279FE10EE7E}" type="datetimeFigureOut">
               <a:rPr lang="en-US" smtClean="0"/>
-              <a:t>3/20/2019</a:t>
+              <a:t>3/20/19</a:t>
             </a:fld>
             <a:endParaRPr lang="en-US"/>
           </a:p>
@@ -1689,7 +1696,7 @@
           <a:lstStyle/>
           <a:p>
             <a:r>
-              <a:rPr lang="en-US" smtClean="0"/>
+              <a:rPr lang="en-US"/>
               <a:t>Click to edit Master title style</a:t>
             </a:r>
             <a:endParaRPr lang="en-US" dirty="0"/>
@@ -1761,7 +1768,7 @@
           <a:p>
             <a:pPr lvl="0"/>
             <a:r>
-              <a:rPr lang="en-US" smtClean="0"/>
+              <a:rPr lang="en-US"/>
               <a:t>Click to edit Master text styles</a:t>
             </a:r>
           </a:p>
@@ -1789,35 +1796,35 @@
           <a:p>
             <a:pPr lvl="0"/>
             <a:r>
-              <a:rPr lang="en-US" smtClean="0"/>
+              <a:rPr lang="en-US"/>
               <a:t>Click to edit Master text styles</a:t>
             </a:r>
           </a:p>
           <a:p>
             <a:pPr lvl="1"/>
             <a:r>
-              <a:rPr lang="en-US" smtClean="0"/>
+              <a:rPr lang="en-US"/>
               <a:t>Second level</a:t>
             </a:r>
           </a:p>
           <a:p>
             <a:pPr lvl="2"/>
             <a:r>
-              <a:rPr lang="en-US" smtClean="0"/>
+              <a:rPr lang="en-US"/>
               <a:t>Third level</a:t>
             </a:r>
           </a:p>
           <a:p>
             <a:pPr lvl="3"/>
             <a:r>
-              <a:rPr lang="en-US" smtClean="0"/>
+              <a:rPr lang="en-US"/>
               <a:t>Fourth level</a:t>
             </a:r>
           </a:p>
           <a:p>
             <a:pPr lvl="4"/>
             <a:r>
-              <a:rPr lang="en-US" smtClean="0"/>
+              <a:rPr lang="en-US"/>
               <a:t>Fifth level</a:t>
             </a:r>
             <a:endParaRPr lang="en-US" dirty="0"/>
@@ -1889,7 +1896,7 @@
           <a:p>
             <a:pPr lvl="0"/>
             <a:r>
-              <a:rPr lang="en-US" smtClean="0"/>
+              <a:rPr lang="en-US"/>
               <a:t>Click to edit Master text styles</a:t>
             </a:r>
           </a:p>
@@ -1917,35 +1924,35 @@
           <a:p>
             <a:pPr lvl="0"/>
             <a:r>
-              <a:rPr lang="en-US" smtClean="0"/>
+              <a:rPr lang="en-US"/>
               <a:t>Click to edit Master text styles</a:t>
             </a:r>
           </a:p>
           <a:p>
             <a:pPr lvl="1"/>
             <a:r>
-              <a:rPr lang="en-US" smtClean="0"/>
+              <a:rPr lang="en-US"/>
               <a:t>Second level</a:t>
             </a:r>
           </a:p>
           <a:p>
             <a:pPr lvl="2"/>
             <a:r>
-              <a:rPr lang="en-US" smtClean="0"/>
+              <a:rPr lang="en-US"/>
               <a:t>Third level</a:t>
             </a:r>
           </a:p>
           <a:p>
             <a:pPr lvl="3"/>
             <a:r>
-              <a:rPr lang="en-US" smtClean="0"/>
+              <a:rPr lang="en-US"/>
               <a:t>Fourth level</a:t>
             </a:r>
           </a:p>
           <a:p>
             <a:pPr lvl="4"/>
             <a:r>
-              <a:rPr lang="en-US" smtClean="0"/>
+              <a:rPr lang="en-US"/>
               <a:t>Fifth level</a:t>
             </a:r>
             <a:endParaRPr lang="en-US" dirty="0"/>
@@ -1969,7 +1976,7 @@
           <a:p>
             <a:fld id="{900C6341-308B-40BC-9484-0279FE10EE7E}" type="datetimeFigureOut">
               <a:rPr lang="en-US" smtClean="0"/>
-              <a:t>3/20/2019</a:t>
+              <a:t>3/20/19</a:t>
             </a:fld>
             <a:endParaRPr lang="en-US"/>
           </a:p>
@@ -2063,7 +2070,7 @@
           <a:lstStyle/>
           <a:p>
             <a:r>
-              <a:rPr lang="en-US" smtClean="0"/>
+              <a:rPr lang="en-US"/>
               <a:t>Click to edit Master title style</a:t>
             </a:r>
             <a:endParaRPr lang="en-US" dirty="0"/>
@@ -2087,7 +2094,7 @@
           <a:p>
             <a:fld id="{900C6341-308B-40BC-9484-0279FE10EE7E}" type="datetimeFigureOut">
               <a:rPr lang="en-US" smtClean="0"/>
-              <a:t>3/20/2019</a:t>
+              <a:t>3/20/19</a:t>
             </a:fld>
             <a:endParaRPr lang="en-US"/>
           </a:p>
@@ -2258,7 +2265,7 @@
           <a:p>
             <a:fld id="{900C6341-308B-40BC-9484-0279FE10EE7E}" type="datetimeFigureOut">
               <a:rPr lang="en-US" smtClean="0"/>
-              <a:t>3/20/2019</a:t>
+              <a:t>3/20/19</a:t>
             </a:fld>
             <a:endParaRPr lang="en-US"/>
           </a:p>
@@ -2451,7 +2458,7 @@
           </a:lstStyle>
           <a:p>
             <a:r>
-              <a:rPr lang="en-US" smtClean="0"/>
+              <a:rPr lang="en-US"/>
               <a:t>Click to edit Master title style</a:t>
             </a:r>
             <a:endParaRPr lang="en-US" dirty="0"/>
@@ -2480,35 +2487,35 @@
           <a:p>
             <a:pPr lvl="0"/>
             <a:r>
-              <a:rPr lang="en-US" smtClean="0"/>
+              <a:rPr lang="en-US"/>
               <a:t>Click to edit Master text styles</a:t>
             </a:r>
           </a:p>
           <a:p>
             <a:pPr lvl="1"/>
             <a:r>
-              <a:rPr lang="en-US" smtClean="0"/>
+              <a:rPr lang="en-US"/>
               <a:t>Second level</a:t>
             </a:r>
           </a:p>
           <a:p>
             <a:pPr lvl="2"/>
             <a:r>
-              <a:rPr lang="en-US" smtClean="0"/>
+              <a:rPr lang="en-US"/>
               <a:t>Third level</a:t>
             </a:r>
           </a:p>
           <a:p>
             <a:pPr lvl="3"/>
             <a:r>
-              <a:rPr lang="en-US" smtClean="0"/>
+              <a:rPr lang="en-US"/>
               <a:t>Fourth level</a:t>
             </a:r>
           </a:p>
           <a:p>
             <a:pPr lvl="4"/>
             <a:r>
-              <a:rPr lang="en-US" smtClean="0"/>
+              <a:rPr lang="en-US"/>
               <a:t>Fifth level</a:t>
             </a:r>
             <a:endParaRPr lang="en-US" dirty="0"/>
@@ -2580,7 +2587,7 @@
           <a:p>
             <a:pPr lvl="0"/>
             <a:r>
-              <a:rPr lang="en-US" smtClean="0"/>
+              <a:rPr lang="en-US"/>
               <a:t>Click to edit Master text styles</a:t>
             </a:r>
           </a:p>
@@ -2612,7 +2619,7 @@
           <a:p>
             <a:fld id="{900C6341-308B-40BC-9484-0279FE10EE7E}" type="datetimeFigureOut">
               <a:rPr lang="en-US" smtClean="0"/>
-              <a:t>3/20/2019</a:t>
+              <a:t>3/20/19</a:t>
             </a:fld>
             <a:endParaRPr lang="en-US"/>
           </a:p>
@@ -2818,7 +2825,7 @@
           </a:lstStyle>
           <a:p>
             <a:r>
-              <a:rPr lang="en-US" smtClean="0"/>
+              <a:rPr lang="en-US"/>
               <a:t>Click to edit Master title style</a:t>
             </a:r>
             <a:endParaRPr lang="en-US" dirty="0"/>
@@ -2888,7 +2895,7 @@
           </a:lstStyle>
           <a:p>
             <a:r>
-              <a:rPr lang="en-US" smtClean="0"/>
+              <a:rPr lang="en-US"/>
               <a:t>Click icon to add picture</a:t>
             </a:r>
             <a:endParaRPr lang="en-US" dirty="0"/>
@@ -2966,7 +2973,7 @@
           <a:p>
             <a:pPr lvl="0"/>
             <a:r>
-              <a:rPr lang="en-US" smtClean="0"/>
+              <a:rPr lang="en-US"/>
               <a:t>Click to edit Master text styles</a:t>
             </a:r>
           </a:p>
@@ -2989,7 +2996,7 @@
           <a:p>
             <a:fld id="{900C6341-308B-40BC-9484-0279FE10EE7E}" type="datetimeFigureOut">
               <a:rPr lang="en-US" smtClean="0"/>
-              <a:t>3/20/2019</a:t>
+              <a:t>3/20/19</a:t>
             </a:fld>
             <a:endParaRPr lang="en-US"/>
           </a:p>
@@ -3174,7 +3181,7 @@
           <a:lstStyle/>
           <a:p>
             <a:r>
-              <a:rPr lang="en-US" smtClean="0"/>
+              <a:rPr lang="en-US"/>
               <a:t>Click to edit Master title style</a:t>
             </a:r>
             <a:endParaRPr lang="en-US" dirty="0"/>
@@ -3208,35 +3215,35 @@
           <a:p>
             <a:pPr lvl="0"/>
             <a:r>
-              <a:rPr lang="en-US" smtClean="0"/>
+              <a:rPr lang="en-US"/>
               <a:t>Click to edit Master text styles</a:t>
             </a:r>
           </a:p>
           <a:p>
             <a:pPr lvl="1"/>
             <a:r>
-              <a:rPr lang="en-US" smtClean="0"/>
+              <a:rPr lang="en-US"/>
               <a:t>Second level</a:t>
             </a:r>
           </a:p>
           <a:p>
             <a:pPr lvl="2"/>
             <a:r>
-              <a:rPr lang="en-US" smtClean="0"/>
+              <a:rPr lang="en-US"/>
               <a:t>Third level</a:t>
             </a:r>
           </a:p>
           <a:p>
             <a:pPr lvl="3"/>
             <a:r>
-              <a:rPr lang="en-US" smtClean="0"/>
+              <a:rPr lang="en-US"/>
               <a:t>Fourth level</a:t>
             </a:r>
           </a:p>
           <a:p>
             <a:pPr lvl="4"/>
             <a:r>
-              <a:rPr lang="en-US" smtClean="0"/>
+              <a:rPr lang="en-US"/>
               <a:t>Fifth level</a:t>
             </a:r>
             <a:endParaRPr lang="en-US" dirty="0"/>
@@ -3276,7 +3283,7 @@
           <a:p>
             <a:fld id="{900C6341-308B-40BC-9484-0279FE10EE7E}" type="datetimeFigureOut">
               <a:rPr lang="en-US" smtClean="0"/>
-              <a:t>3/20/2019</a:t>
+              <a:t>3/20/19</a:t>
             </a:fld>
             <a:endParaRPr lang="en-US"/>
           </a:p>
@@ -3816,10 +3823,9 @@
           <a:lstStyle/>
           <a:p>
             <a:r>
-              <a:rPr lang="en-US" dirty="0" smtClean="0"/>
+              <a:rPr lang="en-US" dirty="0"/>
               <a:t>Inspire Product Redesign</a:t>
             </a:r>
-            <a:endParaRPr lang="en-US" dirty="0"/>
           </a:p>
         </p:txBody>
       </p:sp>
@@ -3839,10 +3845,9 @@
           <a:lstStyle/>
           <a:p>
             <a:r>
-              <a:rPr lang="en-US" dirty="0" smtClean="0"/>
+              <a:rPr lang="en-US" dirty="0"/>
               <a:t>Landon Willey</a:t>
             </a:r>
-            <a:endParaRPr lang="en-US" dirty="0"/>
           </a:p>
         </p:txBody>
       </p:sp>
@@ -3862,6 +3867,14 @@
 <file path=ppt/slides/slide2.xml><?xml version="1.0" encoding="utf-8"?>
 <p:sld xmlns:a="http://schemas.openxmlformats.org/drawingml/2006/main" xmlns:r="http://schemas.openxmlformats.org/officeDocument/2006/relationships" xmlns:p="http://schemas.openxmlformats.org/presentationml/2006/main">
   <p:cSld>
+    <p:bg>
+      <p:bgPr>
+        <a:solidFill>
+          <a:schemeClr val="bg1"/>
+        </a:solidFill>
+        <a:effectLst/>
+      </p:bgPr>
+    </p:bg>
     <p:spTree>
       <p:nvGrpSpPr>
         <p:cNvPr id="1" name=""/>
@@ -3886,96 +3899,194 @@
             <p:ph type="title"/>
           </p:nvPr>
         </p:nvSpPr>
-        <p:spPr/>
-        <p:txBody>
-          <a:bodyPr/>
-          <a:lstStyle/>
-          <a:p>
-            <a:r>
-              <a:rPr lang="en-US" dirty="0" smtClean="0"/>
+        <p:spPr>
+          <a:xfrm>
+            <a:off x="5021942" y="286603"/>
+            <a:ext cx="6133737" cy="1450757"/>
+          </a:xfrm>
+        </p:spPr>
+        <p:txBody>
+          <a:bodyPr>
+            <a:normAutofit/>
+          </a:bodyPr>
+          <a:lstStyle/>
+          <a:p>
+            <a:r>
+              <a:rPr lang="en-US" dirty="0"/>
               <a:t>Problem Statement</a:t>
             </a:r>
+          </a:p>
+        </p:txBody>
+      </p:sp>
+      <p:sp>
+        <p:nvSpPr>
+          <p:cNvPr id="3" name="Content Placeholder 2"/>
+          <p:cNvSpPr>
+            <a:spLocks noGrp="1"/>
+          </p:cNvSpPr>
+          <p:nvPr>
+            <p:ph idx="1"/>
+          </p:nvPr>
+        </p:nvSpPr>
+        <p:spPr>
+          <a:xfrm>
+            <a:off x="5021942" y="1845734"/>
+            <a:ext cx="6133737" cy="4023360"/>
+          </a:xfrm>
+        </p:spPr>
+        <p:txBody>
+          <a:bodyPr>
+            <a:normAutofit/>
+          </a:bodyPr>
+          <a:lstStyle/>
+          <a:p>
+            <a:r>
+              <a:rPr lang="en-US" dirty="0"/>
+              <a:t>Minimize the mass of the chassis for a laser tag robot</a:t>
+            </a:r>
+          </a:p>
+          <a:p>
+            <a:r>
+              <a:rPr lang="en-US" dirty="0"/>
+              <a:t>Original design is about 0.1 x 0.15 x 0.1 m</a:t>
+            </a:r>
+          </a:p>
+          <a:p>
+            <a:r>
+              <a:rPr lang="en-US" dirty="0"/>
+              <a:t>The part will be manufactured via 3D printer</a:t>
+            </a:r>
+          </a:p>
+          <a:p>
+            <a:r>
+              <a:rPr lang="en-US" dirty="0"/>
+              <a:t>Minimal mass will reduce the cost of filament to produce the part</a:t>
+            </a:r>
+          </a:p>
+          <a:p>
             <a:endParaRPr lang="en-US" dirty="0"/>
           </a:p>
         </p:txBody>
       </p:sp>
-      <p:sp>
-        <p:nvSpPr>
-          <p:cNvPr id="3" name="Content Placeholder 2"/>
-          <p:cNvSpPr>
-            <a:spLocks noGrp="1"/>
-          </p:cNvSpPr>
-          <p:nvPr>
-            <p:ph idx="1"/>
-          </p:nvPr>
-        </p:nvSpPr>
-        <p:spPr>
-          <a:xfrm>
-            <a:off x="838200" y="1825625"/>
-            <a:ext cx="4953000" cy="4351338"/>
-          </a:xfrm>
-        </p:spPr>
-        <p:txBody>
-          <a:bodyPr/>
-          <a:lstStyle/>
-          <a:p>
-            <a:r>
-              <a:rPr lang="en-US" dirty="0" smtClean="0"/>
-              <a:t>Kitchen Shelving Unit</a:t>
-            </a:r>
-          </a:p>
-          <a:p>
-            <a:r>
-              <a:rPr lang="en-US" dirty="0" smtClean="0"/>
-              <a:t>About 2 </a:t>
-            </a:r>
-            <a:r>
-              <a:rPr lang="en-US" dirty="0" err="1" smtClean="0"/>
-              <a:t>ft</a:t>
-            </a:r>
-            <a:r>
-              <a:rPr lang="en-US" dirty="0" smtClean="0"/>
-              <a:t> x 1 </a:t>
-            </a:r>
-            <a:r>
-              <a:rPr lang="en-US" dirty="0" err="1" smtClean="0"/>
-              <a:t>ft</a:t>
-            </a:r>
-            <a:r>
-              <a:rPr lang="en-US" dirty="0" smtClean="0"/>
-              <a:t> x 2.5 </a:t>
-            </a:r>
-            <a:r>
-              <a:rPr lang="en-US" dirty="0" err="1" smtClean="0"/>
-              <a:t>ft</a:t>
-            </a:r>
-            <a:endParaRPr lang="en-US" dirty="0" smtClean="0"/>
-          </a:p>
-          <a:p>
-            <a:r>
-              <a:rPr lang="en-US" dirty="0" smtClean="0"/>
-              <a:t>Three Shelves</a:t>
-            </a:r>
-          </a:p>
-          <a:p>
-            <a:r>
-              <a:rPr lang="en-US" dirty="0" smtClean="0"/>
-              <a:t>Minimize weight for current application (&lt;30 </a:t>
-            </a:r>
-            <a:r>
-              <a:rPr lang="en-US" dirty="0" err="1" smtClean="0"/>
-              <a:t>lbs</a:t>
-            </a:r>
-            <a:r>
-              <a:rPr lang="en-US" dirty="0" smtClean="0"/>
-              <a:t> per shelf)</a:t>
-            </a:r>
-          </a:p>
-          <a:p>
-            <a:endParaRPr lang="en-US" dirty="0"/>
-          </a:p>
-        </p:txBody>
-      </p:sp>
+      <p:pic>
+        <p:nvPicPr>
+          <p:cNvPr id="9" name="Picture 8">
+            <a:extLst>
+              <a:ext uri="{FF2B5EF4-FFF2-40B4-BE49-F238E27FC236}">
+                <a16:creationId xmlns:a16="http://schemas.microsoft.com/office/drawing/2014/main" id="{5C39571D-3CA8-3842-9F46-7A6DA2B3D96B}"/>
+              </a:ext>
+            </a:extLst>
+          </p:cNvPr>
+          <p:cNvPicPr>
+            <a:picLocks noChangeAspect="1"/>
+          </p:cNvPicPr>
+          <p:nvPr/>
+        </p:nvPicPr>
+        <p:blipFill>
+          <a:blip r:embed="rId2">
+            <a:extLst>
+              <a:ext uri="{28A0092B-C50C-407E-A947-70E740481C1C}">
+                <a14:useLocalDpi xmlns:a14="http://schemas.microsoft.com/office/drawing/2010/main" val="0"/>
+              </a:ext>
+            </a:extLst>
+          </a:blip>
+          <a:stretch>
+            <a:fillRect/>
+          </a:stretch>
+        </p:blipFill>
+        <p:spPr>
+          <a:xfrm>
+            <a:off x="650713" y="3357153"/>
+            <a:ext cx="3753532" cy="2815149"/>
+          </a:xfrm>
+          <a:prstGeom prst="rect">
+            <a:avLst/>
+          </a:prstGeom>
+        </p:spPr>
+      </p:pic>
+      <p:sp>
+        <p:nvSpPr>
+          <p:cNvPr id="10" name="Rectangle 9">
+            <a:extLst>
+              <a:ext uri="{FF2B5EF4-FFF2-40B4-BE49-F238E27FC236}">
+                <a16:creationId xmlns:a16="http://schemas.microsoft.com/office/drawing/2014/main" id="{96CDFD14-772C-7B47-9A4D-6AD5F37222CE}"/>
+              </a:ext>
+            </a:extLst>
+          </p:cNvPr>
+          <p:cNvSpPr/>
+          <p:nvPr/>
+        </p:nvSpPr>
+        <p:spPr>
+          <a:xfrm>
+            <a:off x="508000" y="1001486"/>
+            <a:ext cx="4513942" cy="1219200"/>
+          </a:xfrm>
+          <a:prstGeom prst="rect">
+            <a:avLst/>
+          </a:prstGeom>
+          <a:ln>
+            <a:noFill/>
+          </a:ln>
+        </p:spPr>
+        <p:style>
+          <a:lnRef idx="2">
+            <a:schemeClr val="accent6"/>
+          </a:lnRef>
+          <a:fillRef idx="1">
+            <a:schemeClr val="lt1"/>
+          </a:fillRef>
+          <a:effectRef idx="0">
+            <a:schemeClr val="accent6"/>
+          </a:effectRef>
+          <a:fontRef idx="minor">
+            <a:schemeClr val="dk1"/>
+          </a:fontRef>
+        </p:style>
+        <p:txBody>
+          <a:bodyPr rtlCol="0" anchor="ctr"/>
+          <a:lstStyle/>
+          <a:p>
+            <a:pPr algn="ctr"/>
+            <a:endParaRPr lang="en-US"/>
+          </a:p>
+        </p:txBody>
+      </p:sp>
+      <p:pic>
+        <p:nvPicPr>
+          <p:cNvPr id="7" name="Picture 6">
+            <a:extLst>
+              <a:ext uri="{FF2B5EF4-FFF2-40B4-BE49-F238E27FC236}">
+                <a16:creationId xmlns:a16="http://schemas.microsoft.com/office/drawing/2014/main" id="{3CFF9441-F637-E54E-AC29-100430DBFEFE}"/>
+              </a:ext>
+            </a:extLst>
+          </p:cNvPr>
+          <p:cNvPicPr>
+            <a:picLocks noChangeAspect="1"/>
+          </p:cNvPicPr>
+          <p:nvPr/>
+        </p:nvPicPr>
+        <p:blipFill>
+          <a:blip r:embed="rId3">
+            <a:extLst>
+              <a:ext uri="{28A0092B-C50C-407E-A947-70E740481C1C}">
+                <a14:useLocalDpi xmlns:a14="http://schemas.microsoft.com/office/drawing/2010/main" val="0"/>
+              </a:ext>
+            </a:extLst>
+          </a:blip>
+          <a:stretch>
+            <a:fillRect/>
+          </a:stretch>
+        </p:blipFill>
+        <p:spPr>
+          <a:xfrm>
+            <a:off x="650713" y="286602"/>
+            <a:ext cx="3753532" cy="3070551"/>
+          </a:xfrm>
+          <a:prstGeom prst="rect">
+            <a:avLst/>
+          </a:prstGeom>
+        </p:spPr>
+      </p:pic>
     </p:spTree>
     <p:extLst>
       <p:ext uri="{BB962C8B-B14F-4D97-AF65-F5344CB8AC3E}">
@@ -3992,6 +4103,14 @@
 <file path=ppt/slides/slide3.xml><?xml version="1.0" encoding="utf-8"?>
 <p:sld xmlns:a="http://schemas.openxmlformats.org/drawingml/2006/main" xmlns:r="http://schemas.openxmlformats.org/officeDocument/2006/relationships" xmlns:p="http://schemas.openxmlformats.org/presentationml/2006/main">
   <p:cSld>
+    <p:bg>
+      <p:bgPr>
+        <a:solidFill>
+          <a:schemeClr val="bg1"/>
+        </a:solidFill>
+        <a:effectLst/>
+      </p:bgPr>
+    </p:bg>
     <p:spTree>
       <p:nvGrpSpPr>
         <p:cNvPr id="1" name=""/>
@@ -4006,6 +4125,41 @@
           <a:chExt cx="0" cy="0"/>
         </a:xfrm>
       </p:grpSpPr>
+      <p:pic>
+        <p:nvPicPr>
+          <p:cNvPr id="13" name="Picture 12">
+            <a:extLst>
+              <a:ext uri="{FF2B5EF4-FFF2-40B4-BE49-F238E27FC236}">
+                <a16:creationId xmlns:a16="http://schemas.microsoft.com/office/drawing/2014/main" id="{B49D2022-2515-5046-A638-22ACF0F0D4C9}"/>
+              </a:ext>
+            </a:extLst>
+          </p:cNvPr>
+          <p:cNvPicPr>
+            <a:picLocks noChangeAspect="1"/>
+          </p:cNvPicPr>
+          <p:nvPr/>
+        </p:nvPicPr>
+        <p:blipFill rotWithShape="1">
+          <a:blip r:embed="rId2">
+            <a:extLst>
+              <a:ext uri="{28A0092B-C50C-407E-A947-70E740481C1C}">
+                <a14:useLocalDpi xmlns:a14="http://schemas.microsoft.com/office/drawing/2010/main" val="0"/>
+              </a:ext>
+            </a:extLst>
+          </a:blip>
+          <a:srcRect l="6909"/>
+          <a:stretch/>
+        </p:blipFill>
+        <p:spPr>
+          <a:xfrm>
+            <a:off x="7350629" y="1845734"/>
+            <a:ext cx="3805051" cy="4023360"/>
+          </a:xfrm>
+          <a:prstGeom prst="rect">
+            <a:avLst/>
+          </a:prstGeom>
+        </p:spPr>
+      </p:pic>
       <p:sp>
         <p:nvSpPr>
           <p:cNvPr id="2" name="Title 1"/>
@@ -4016,30 +4170,12 @@
             <p:ph type="title"/>
           </p:nvPr>
         </p:nvSpPr>
-        <p:spPr/>
-        <p:txBody>
-          <a:bodyPr/>
-          <a:lstStyle/>
-          <a:p>
-            <a:r>
-              <a:rPr lang="en-US" dirty="0" smtClean="0"/>
-              <a:t>Inspire Tools</a:t>
-            </a:r>
-            <a:endParaRPr lang="en-US" dirty="0"/>
-          </a:p>
-        </p:txBody>
-      </p:sp>
-      <p:sp>
-        <p:nvSpPr>
-          <p:cNvPr id="3" name="Content Placeholder 2"/>
-          <p:cNvSpPr>
-            <a:spLocks noGrp="1"/>
-          </p:cNvSpPr>
-          <p:nvPr>
-            <p:ph idx="1"/>
-          </p:nvPr>
-        </p:nvSpPr>
-        <p:spPr/>
+        <p:spPr>
+          <a:xfrm>
+            <a:off x="1097280" y="286603"/>
+            <a:ext cx="10058400" cy="1450757"/>
+          </a:xfrm>
+        </p:spPr>
         <p:txBody>
           <a:bodyPr>
             <a:normAutofit/>
@@ -4047,58 +4183,87 @@
           <a:lstStyle/>
           <a:p>
             <a:r>
-              <a:rPr lang="en-US" dirty="0" smtClean="0"/>
+              <a:rPr lang="en-US"/>
+              <a:t>Inspire Tools</a:t>
+            </a:r>
+            <a:endParaRPr lang="en-US" dirty="0"/>
+          </a:p>
+        </p:txBody>
+      </p:sp>
+      <p:sp>
+        <p:nvSpPr>
+          <p:cNvPr id="3" name="Content Placeholder 2"/>
+          <p:cNvSpPr>
+            <a:spLocks noGrp="1"/>
+          </p:cNvSpPr>
+          <p:nvPr>
+            <p:ph idx="1"/>
+          </p:nvPr>
+        </p:nvSpPr>
+        <p:spPr>
+          <a:xfrm>
+            <a:off x="1097280" y="1845734"/>
+            <a:ext cx="6047799" cy="4023360"/>
+          </a:xfrm>
+        </p:spPr>
+        <p:txBody>
+          <a:bodyPr>
+            <a:normAutofit/>
+          </a:bodyPr>
+          <a:lstStyle/>
+          <a:p>
+            <a:r>
+              <a:rPr lang="en-US" dirty="0"/>
               <a:t>Geometry</a:t>
             </a:r>
           </a:p>
           <a:p>
             <a:pPr lvl="1"/>
             <a:r>
-              <a:rPr lang="en-US" dirty="0" smtClean="0"/>
-              <a:t>Cut: Separated the design space from the rest of the model</a:t>
+              <a:rPr lang="en-US" dirty="0"/>
+              <a:t>Push/Pull: Created tool parts to separate the design space from the required sections</a:t>
             </a:r>
           </a:p>
           <a:p>
             <a:pPr lvl="1"/>
             <a:r>
-              <a:rPr lang="en-US" dirty="0" smtClean="0"/>
-              <a:t>Push/Pull: Created areas where the loads can act (since the loads can’t act directly on the design space)</a:t>
-            </a:r>
-          </a:p>
-          <a:p>
-            <a:r>
-              <a:rPr lang="en-US" dirty="0" smtClean="0"/>
+              <a:rPr lang="en-US" dirty="0"/>
+              <a:t>Intersect: Used the tool parts to separate the design space</a:t>
+            </a:r>
+          </a:p>
+          <a:p>
+            <a:r>
+              <a:rPr lang="en-US" dirty="0"/>
               <a:t>Structure</a:t>
             </a:r>
           </a:p>
           <a:p>
             <a:pPr lvl="1"/>
             <a:r>
-              <a:rPr lang="en-US" dirty="0" smtClean="0"/>
-              <a:t>Supports: Modeled the base of each leg as a pin support</a:t>
+              <a:rPr lang="en-US" dirty="0"/>
+              <a:t>Supports: Modeled motor contacts and roller wheel as pin supports</a:t>
             </a:r>
           </a:p>
           <a:p>
             <a:pPr lvl="1"/>
             <a:r>
-              <a:rPr lang="en-US" dirty="0" smtClean="0"/>
-              <a:t>Loads: Simulated objects as point loads on solid plates on each shelf</a:t>
+              <a:rPr lang="en-US" dirty="0"/>
+              <a:t>Loads: Simulated hanging PCB, servo, and outer structure as point loads</a:t>
             </a:r>
           </a:p>
           <a:p>
             <a:pPr lvl="1"/>
             <a:r>
-              <a:rPr lang="en-US" dirty="0" smtClean="0"/>
+              <a:rPr lang="en-US" dirty="0"/>
               <a:t>Gravity: Simulated the weight of the structure</a:t>
             </a:r>
           </a:p>
           <a:p>
             <a:pPr lvl="1"/>
             <a:r>
-              <a:rPr lang="en-US" dirty="0" smtClean="0"/>
-              <a:t>Symmetry: Constrained the shelf shape to be symmetric (excluding the x-y plane)</a:t>
-            </a:r>
-            <a:endParaRPr lang="en-US" dirty="0"/>
+              <a:rPr lang="en-US" dirty="0"/>
+              <a:t>Overhang: Constrained the overhang to less than 45 degrees to allow for 3D printing</a:t>
+            </a:r>
           </a:p>
         </p:txBody>
       </p:sp>
@@ -4118,6 +4283,14 @@
 <file path=ppt/slides/slide4.xml><?xml version="1.0" encoding="utf-8"?>
 <p:sld xmlns:a="http://schemas.openxmlformats.org/drawingml/2006/main" xmlns:r="http://schemas.openxmlformats.org/officeDocument/2006/relationships" xmlns:p="http://schemas.openxmlformats.org/presentationml/2006/main">
   <p:cSld>
+    <p:bg>
+      <p:bgPr>
+        <a:solidFill>
+          <a:schemeClr val="bg1"/>
+        </a:solidFill>
+        <a:effectLst/>
+      </p:bgPr>
+    </p:bg>
     <p:spTree>
       <p:nvGrpSpPr>
         <p:cNvPr id="1" name=""/>
@@ -4132,6 +4305,42 @@
           <a:chExt cx="0" cy="0"/>
         </a:xfrm>
       </p:grpSpPr>
+      <p:pic>
+        <p:nvPicPr>
+          <p:cNvPr id="7" name="Picture 6">
+            <a:extLst>
+              <a:ext uri="{FF2B5EF4-FFF2-40B4-BE49-F238E27FC236}">
+                <a16:creationId xmlns:a16="http://schemas.microsoft.com/office/drawing/2014/main" id="{D848E5AE-147C-BF41-8F26-34D8F04B5E96}"/>
+              </a:ext>
+            </a:extLst>
+          </p:cNvPr>
+          <p:cNvPicPr>
+            <a:picLocks noChangeAspect="1"/>
+          </p:cNvPicPr>
+          <p:nvPr/>
+        </p:nvPicPr>
+        <p:blipFill>
+          <a:blip r:embed="rId2">
+            <a:extLst>
+              <a:ext uri="{28A0092B-C50C-407E-A947-70E740481C1C}">
+                <a14:useLocalDpi xmlns:a14="http://schemas.microsoft.com/office/drawing/2010/main" val="0"/>
+              </a:ext>
+            </a:extLst>
+          </a:blip>
+          <a:stretch>
+            <a:fillRect/>
+          </a:stretch>
+        </p:blipFill>
+        <p:spPr>
+          <a:xfrm>
+            <a:off x="7436476" y="1845735"/>
+            <a:ext cx="3719203" cy="3952776"/>
+          </a:xfrm>
+          <a:prstGeom prst="rect">
+            <a:avLst/>
+          </a:prstGeom>
+        </p:spPr>
+      </p:pic>
       <p:sp>
         <p:nvSpPr>
           <p:cNvPr id="2" name="Title 1"/>
@@ -4142,13 +4351,20 @@
             <p:ph type="title"/>
           </p:nvPr>
         </p:nvSpPr>
-        <p:spPr/>
-        <p:txBody>
-          <a:bodyPr/>
-          <a:lstStyle/>
-          <a:p>
-            <a:r>
-              <a:rPr lang="en-US" dirty="0" smtClean="0"/>
+        <p:spPr>
+          <a:xfrm>
+            <a:off x="1097280" y="286603"/>
+            <a:ext cx="10058400" cy="1450757"/>
+          </a:xfrm>
+        </p:spPr>
+        <p:txBody>
+          <a:bodyPr>
+            <a:normAutofit/>
+          </a:bodyPr>
+          <a:lstStyle/>
+          <a:p>
+            <a:r>
+              <a:rPr lang="en-US"/>
               <a:t>Results</a:t>
             </a:r>
             <a:endParaRPr lang="en-US" dirty="0"/>
@@ -4167,47 +4383,52 @@
         </p:nvSpPr>
         <p:spPr>
           <a:xfrm>
-            <a:off x="838200" y="1825625"/>
-            <a:ext cx="5274733" cy="4351338"/>
-          </a:xfrm>
-        </p:spPr>
-        <p:txBody>
-          <a:bodyPr/>
-          <a:lstStyle/>
-          <a:p>
-            <a:r>
-              <a:rPr lang="en-US" dirty="0" smtClean="0"/>
-              <a:t>Minimize mass with a safety factor of 2.0 was unable to produce a structure</a:t>
-            </a:r>
-          </a:p>
-          <a:p>
-            <a:r>
-              <a:rPr lang="en-US" dirty="0" smtClean="0"/>
-              <a:t>Minimize stiffness resulted in an undesirable structure</a:t>
-            </a:r>
-          </a:p>
-          <a:p>
-            <a:r>
-              <a:rPr lang="en-US" dirty="0" smtClean="0"/>
-              <a:t>Mass was reduced from 88.7 </a:t>
-            </a:r>
-            <a:r>
-              <a:rPr lang="en-US" dirty="0" err="1" smtClean="0"/>
-              <a:t>lbs</a:t>
-            </a:r>
-            <a:r>
-              <a:rPr lang="en-US" dirty="0" smtClean="0"/>
-              <a:t> to 34.5 </a:t>
-            </a:r>
-            <a:r>
-              <a:rPr lang="en-US" dirty="0" err="1" smtClean="0"/>
-              <a:t>lbs</a:t>
-            </a:r>
-            <a:r>
-              <a:rPr lang="en-US" dirty="0" smtClean="0"/>
-              <a:t>, a 60% reduction</a:t>
-            </a:r>
-            <a:endParaRPr lang="en-US" dirty="0"/>
+            <a:off x="1097279" y="1845734"/>
+            <a:ext cx="6029235" cy="4023360"/>
+          </a:xfrm>
+        </p:spPr>
+        <p:txBody>
+          <a:bodyPr>
+            <a:normAutofit/>
+          </a:bodyPr>
+          <a:lstStyle/>
+          <a:p>
+            <a:r>
+              <a:rPr lang="en-US" dirty="0"/>
+              <a:t>Minimize mass with a safety factor of 2.0 was unable to produce a structure, but minimize stiffness was able to generate with a design</a:t>
+            </a:r>
+          </a:p>
+          <a:p>
+            <a:r>
+              <a:rPr lang="en-US" dirty="0"/>
+              <a:t>Weight was reduced from 0.32 kg to 0.16 kg</a:t>
+            </a:r>
+          </a:p>
+          <a:p>
+            <a:pPr lvl="1"/>
+            <a:r>
+              <a:rPr lang="en-US" dirty="0"/>
+              <a:t>50% reduction</a:t>
+            </a:r>
+          </a:p>
+          <a:p>
+            <a:pPr lvl="1"/>
+            <a:r>
+              <a:rPr lang="en-US" dirty="0"/>
+              <a:t>$11 savings per part at $0.07/gram</a:t>
+            </a:r>
+          </a:p>
+          <a:p>
+            <a:r>
+              <a:rPr lang="en-US" dirty="0"/>
+              <a:t>Structure appears feasible to 3D print after smoothing</a:t>
+            </a:r>
+          </a:p>
+          <a:p>
+            <a:r>
+              <a:rPr lang="en-US" dirty="0"/>
+              <a:t>Support structure of some features would not be sufficient to achieve necessary tolerances (i.e. for the motor mounts)</a:t>
+            </a:r>
           </a:p>
         </p:txBody>
       </p:sp>
@@ -4241,6 +4462,42 @@
           <a:chExt cx="0" cy="0"/>
         </a:xfrm>
       </p:grpSpPr>
+      <p:pic>
+        <p:nvPicPr>
+          <p:cNvPr id="7" name="Picture 6">
+            <a:extLst>
+              <a:ext uri="{FF2B5EF4-FFF2-40B4-BE49-F238E27FC236}">
+                <a16:creationId xmlns:a16="http://schemas.microsoft.com/office/drawing/2014/main" id="{50215041-D9FE-1746-B160-9B4EDCCD829C}"/>
+              </a:ext>
+            </a:extLst>
+          </p:cNvPr>
+          <p:cNvPicPr>
+            <a:picLocks noChangeAspect="1"/>
+          </p:cNvPicPr>
+          <p:nvPr/>
+        </p:nvPicPr>
+        <p:blipFill>
+          <a:blip r:embed="rId2">
+            <a:extLst>
+              <a:ext uri="{28A0092B-C50C-407E-A947-70E740481C1C}">
+                <a14:useLocalDpi xmlns:a14="http://schemas.microsoft.com/office/drawing/2010/main" val="0"/>
+              </a:ext>
+            </a:extLst>
+          </a:blip>
+          <a:stretch>
+            <a:fillRect/>
+          </a:stretch>
+        </p:blipFill>
+        <p:spPr>
+          <a:xfrm>
+            <a:off x="1036319" y="3428998"/>
+            <a:ext cx="2505988" cy="2661501"/>
+          </a:xfrm>
+          <a:prstGeom prst="rect">
+            <a:avLst/>
+          </a:prstGeom>
+        </p:spPr>
+      </p:pic>
       <p:sp>
         <p:nvSpPr>
           <p:cNvPr id="2" name="Title 1"/>
@@ -4257,10 +4514,9 @@
           <a:lstStyle/>
           <a:p>
             <a:r>
-              <a:rPr lang="en-US" dirty="0" smtClean="0"/>
+              <a:rPr lang="en-US" dirty="0"/>
               <a:t>Discussion</a:t>
             </a:r>
-            <a:endParaRPr lang="en-US" dirty="0"/>
           </a:p>
         </p:txBody>
       </p:sp>
@@ -4274,90 +4530,228 @@
             <p:ph idx="1"/>
           </p:nvPr>
         </p:nvSpPr>
-        <p:spPr/>
+        <p:spPr>
+          <a:xfrm>
+            <a:off x="1097280" y="1845734"/>
+            <a:ext cx="10058400" cy="1535049"/>
+          </a:xfrm>
+        </p:spPr>
         <p:txBody>
           <a:bodyPr>
-            <a:normAutofit fontScale="92500" lnSpcReduction="10000"/>
+            <a:normAutofit/>
           </a:bodyPr>
           <a:lstStyle/>
           <a:p>
             <a:r>
-              <a:rPr lang="en-US" dirty="0" smtClean="0"/>
-              <a:t>The inability to produce a structure was a common problem with the optimization of other objects as well</a:t>
+              <a:rPr lang="en-US" dirty="0"/>
+              <a:t>The inability to produce a structure when attempting to minimize mass was a common problem with the optimization of other objects as well</a:t>
             </a:r>
           </a:p>
           <a:p>
             <a:pPr lvl="1"/>
             <a:r>
-              <a:rPr lang="en-US" dirty="0" smtClean="0"/>
+              <a:rPr lang="en-US" dirty="0"/>
               <a:t>Three total objects were attempted (robot base and two different styles of shelves)</a:t>
             </a:r>
           </a:p>
           <a:p>
             <a:pPr lvl="1"/>
             <a:r>
-              <a:rPr lang="en-US" dirty="0" smtClean="0"/>
-              <a:t>In each case, the program prompted to use more realistic loads, but gave no further information as to why the structure couldn’t be optimized</a:t>
-            </a:r>
-          </a:p>
-          <a:p>
-            <a:r>
-              <a:rPr lang="en-US" dirty="0" smtClean="0"/>
-              <a:t>The minimum member size combined with runtime was a major limiting factor of the program</a:t>
-            </a:r>
-          </a:p>
-          <a:p>
-            <a:pPr lvl="1"/>
-            <a:r>
-              <a:rPr lang="en-US" dirty="0" smtClean="0"/>
-              <a:t>The actual shelf had 1/16 in. diameter members</a:t>
-            </a:r>
-          </a:p>
-          <a:p>
-            <a:pPr lvl="1"/>
-            <a:r>
-              <a:rPr lang="en-US" dirty="0" smtClean="0"/>
-              <a:t>Inspire was unable to optimize with minimum members greater than 1/3 in.</a:t>
-            </a:r>
-          </a:p>
-          <a:p>
-            <a:pPr lvl="1"/>
-            <a:r>
-              <a:rPr lang="en-US" dirty="0" smtClean="0"/>
-              <a:t>Smallest minimum member size with &lt;30 minute runtime was 1 in.</a:t>
-            </a:r>
-          </a:p>
-          <a:p>
-            <a:r>
-              <a:rPr lang="en-US" dirty="0" smtClean="0"/>
-              <a:t>The shape determined was not innovative</a:t>
-            </a:r>
-          </a:p>
-          <a:p>
-            <a:pPr lvl="1"/>
-            <a:r>
-              <a:rPr lang="en-US" dirty="0" smtClean="0"/>
-              <a:t>While many of the truss structures were unique and interesting, the design for the shelf was essentially a thinner shelf</a:t>
-            </a:r>
-          </a:p>
-          <a:p>
-            <a:pPr lvl="1"/>
-            <a:r>
-              <a:rPr lang="en-US" dirty="0" smtClean="0"/>
-              <a:t>The actual wire-frame construction was more unique than </a:t>
-            </a:r>
-            <a:r>
-              <a:rPr lang="en-US" dirty="0" err="1" smtClean="0"/>
-              <a:t>Inspire’s</a:t>
-            </a:r>
-            <a:r>
-              <a:rPr lang="en-US" dirty="0" smtClean="0"/>
-              <a:t> result</a:t>
-            </a:r>
-            <a:endParaRPr lang="en-US" dirty="0"/>
-          </a:p>
-        </p:txBody>
-      </p:sp>
+              <a:rPr lang="en-US" dirty="0"/>
+              <a:t>In each case when the minimize mass was set as the objective, the program suggested the use of more realistic loads, but gave no further information as to why the structure couldn’t be optimized</a:t>
+            </a:r>
+          </a:p>
+        </p:txBody>
+      </p:sp>
+      <p:pic>
+        <p:nvPicPr>
+          <p:cNvPr id="5" name="Picture 4">
+            <a:extLst>
+              <a:ext uri="{FF2B5EF4-FFF2-40B4-BE49-F238E27FC236}">
+                <a16:creationId xmlns:a16="http://schemas.microsoft.com/office/drawing/2014/main" id="{B504269B-DA02-2147-8E96-351BB4F3EDC2}"/>
+              </a:ext>
+            </a:extLst>
+          </p:cNvPr>
+          <p:cNvPicPr>
+            <a:picLocks noChangeAspect="1"/>
+          </p:cNvPicPr>
+          <p:nvPr/>
+        </p:nvPicPr>
+        <p:blipFill rotWithShape="1">
+          <a:blip r:embed="rId3">
+            <a:extLst>
+              <a:ext uri="{28A0092B-C50C-407E-A947-70E740481C1C}">
+                <a14:useLocalDpi xmlns:a14="http://schemas.microsoft.com/office/drawing/2010/main" val="0"/>
+              </a:ext>
+            </a:extLst>
+          </a:blip>
+          <a:srcRect l="6909"/>
+          <a:stretch/>
+        </p:blipFill>
+        <p:spPr>
+          <a:xfrm>
+            <a:off x="4964752" y="3379846"/>
+            <a:ext cx="2517087" cy="2661501"/>
+          </a:xfrm>
+          <a:prstGeom prst="rect">
+            <a:avLst/>
+          </a:prstGeom>
+        </p:spPr>
+      </p:pic>
+      <p:sp>
+        <p:nvSpPr>
+          <p:cNvPr id="8" name="Right Arrow 7">
+            <a:extLst>
+              <a:ext uri="{FF2B5EF4-FFF2-40B4-BE49-F238E27FC236}">
+                <a16:creationId xmlns:a16="http://schemas.microsoft.com/office/drawing/2014/main" id="{238000FA-D348-8D48-BECA-A731BD395530}"/>
+              </a:ext>
+            </a:extLst>
+          </p:cNvPr>
+          <p:cNvSpPr/>
+          <p:nvPr/>
+        </p:nvSpPr>
+        <p:spPr>
+          <a:xfrm flipH="1">
+            <a:off x="3707354" y="4134623"/>
+            <a:ext cx="1059055" cy="1250253"/>
+          </a:xfrm>
+          <a:prstGeom prst="rightArrow">
+            <a:avLst/>
+          </a:prstGeom>
+          <a:solidFill>
+            <a:schemeClr val="accent2"/>
+          </a:solidFill>
+          <a:ln>
+            <a:solidFill>
+              <a:schemeClr val="accent2">
+                <a:lumMod val="75000"/>
+              </a:schemeClr>
+            </a:solidFill>
+          </a:ln>
+        </p:spPr>
+        <p:style>
+          <a:lnRef idx="2">
+            <a:schemeClr val="accent1">
+              <a:shade val="50000"/>
+            </a:schemeClr>
+          </a:lnRef>
+          <a:fillRef idx="1">
+            <a:schemeClr val="accent1"/>
+          </a:fillRef>
+          <a:effectRef idx="0">
+            <a:schemeClr val="accent1"/>
+          </a:effectRef>
+          <a:fontRef idx="minor">
+            <a:schemeClr val="lt1"/>
+          </a:fontRef>
+        </p:style>
+        <p:txBody>
+          <a:bodyPr rtlCol="0" anchor="ctr"/>
+          <a:lstStyle/>
+          <a:p>
+            <a:pPr algn="ctr"/>
+            <a:r>
+              <a:rPr lang="en-US" dirty="0"/>
+              <a:t>Min Mass</a:t>
+            </a:r>
+          </a:p>
+        </p:txBody>
+      </p:sp>
+      <p:sp>
+        <p:nvSpPr>
+          <p:cNvPr id="9" name="Right Arrow 8">
+            <a:extLst>
+              <a:ext uri="{FF2B5EF4-FFF2-40B4-BE49-F238E27FC236}">
+                <a16:creationId xmlns:a16="http://schemas.microsoft.com/office/drawing/2014/main" id="{389DA831-DE16-D940-AFC8-5DA8D95CDB43}"/>
+              </a:ext>
+            </a:extLst>
+          </p:cNvPr>
+          <p:cNvSpPr/>
+          <p:nvPr/>
+        </p:nvSpPr>
+        <p:spPr>
+          <a:xfrm>
+            <a:off x="7646886" y="4134623"/>
+            <a:ext cx="1059053" cy="1250253"/>
+          </a:xfrm>
+          <a:prstGeom prst="rightArrow">
+            <a:avLst/>
+          </a:prstGeom>
+          <a:solidFill>
+            <a:schemeClr val="accent2"/>
+          </a:solidFill>
+          <a:ln>
+            <a:solidFill>
+              <a:schemeClr val="accent2">
+                <a:lumMod val="75000"/>
+              </a:schemeClr>
+            </a:solidFill>
+          </a:ln>
+        </p:spPr>
+        <p:style>
+          <a:lnRef idx="2">
+            <a:schemeClr val="accent1">
+              <a:shade val="50000"/>
+            </a:schemeClr>
+          </a:lnRef>
+          <a:fillRef idx="1">
+            <a:schemeClr val="accent1"/>
+          </a:fillRef>
+          <a:effectRef idx="0">
+            <a:schemeClr val="accent1"/>
+          </a:effectRef>
+          <a:fontRef idx="minor">
+            <a:schemeClr val="lt1"/>
+          </a:fontRef>
+        </p:style>
+        <p:txBody>
+          <a:bodyPr rtlCol="0" anchor="ctr"/>
+          <a:lstStyle/>
+          <a:p>
+            <a:pPr algn="ctr"/>
+            <a:r>
+              <a:rPr lang="en-US" dirty="0"/>
+              <a:t>Max Stiff</a:t>
+            </a:r>
+          </a:p>
+        </p:txBody>
+      </p:sp>
+      <p:pic>
+        <p:nvPicPr>
+          <p:cNvPr id="11" name="Picture 10">
+            <a:extLst>
+              <a:ext uri="{FF2B5EF4-FFF2-40B4-BE49-F238E27FC236}">
+                <a16:creationId xmlns:a16="http://schemas.microsoft.com/office/drawing/2014/main" id="{BC98A75D-F0F9-1644-A405-BCA38F1A36F6}"/>
+              </a:ext>
+            </a:extLst>
+          </p:cNvPr>
+          <p:cNvPicPr>
+            <a:picLocks noChangeAspect="1"/>
+          </p:cNvPicPr>
+          <p:nvPr/>
+        </p:nvPicPr>
+        <p:blipFill>
+          <a:blip r:embed="rId4">
+            <a:extLst>
+              <a:ext uri="{28A0092B-C50C-407E-A947-70E740481C1C}">
+                <a14:useLocalDpi xmlns:a14="http://schemas.microsoft.com/office/drawing/2010/main" val="0"/>
+              </a:ext>
+            </a:extLst>
+          </a:blip>
+          <a:stretch>
+            <a:fillRect/>
+          </a:stretch>
+        </p:blipFill>
+        <p:spPr>
+          <a:xfrm>
+            <a:off x="8882085" y="3477217"/>
+            <a:ext cx="2273595" cy="2613284"/>
+          </a:xfrm>
+          <a:prstGeom prst="rect">
+            <a:avLst/>
+          </a:prstGeom>
+        </p:spPr>
+      </p:pic>
     </p:spTree>
     <p:extLst>
       <p:ext uri="{BB962C8B-B14F-4D97-AF65-F5344CB8AC3E}">
@@ -4404,10 +4798,9 @@
           <a:lstStyle/>
           <a:p>
             <a:r>
-              <a:rPr lang="en-US" dirty="0" smtClean="0"/>
-              <a:t>Conclusion</a:t>
-            </a:r>
-            <a:endParaRPr lang="en-US" dirty="0"/>
+              <a:rPr lang="en-US" dirty="0"/>
+              <a:t>Discussion</a:t>
+            </a:r>
           </a:p>
         </p:txBody>
       </p:sp>
@@ -4421,22 +4814,506 @@
             <p:ph idx="1"/>
           </p:nvPr>
         </p:nvSpPr>
+        <p:spPr>
+          <a:xfrm>
+            <a:off x="1097280" y="1845734"/>
+            <a:ext cx="5544458" cy="4023360"/>
+          </a:xfrm>
+        </p:spPr>
+        <p:txBody>
+          <a:bodyPr>
+            <a:normAutofit/>
+          </a:bodyPr>
+          <a:lstStyle/>
+          <a:p>
+            <a:r>
+              <a:rPr lang="en-US" dirty="0"/>
+              <a:t>The minimum member size combined with runtime was a major limiting factor of the program</a:t>
+            </a:r>
+          </a:p>
+          <a:p>
+            <a:pPr lvl="1"/>
+            <a:r>
+              <a:rPr lang="en-US" dirty="0"/>
+              <a:t>Printer has a tolerance of 0.4 mm, but Inspire couldn’t do less than 2.3 mm</a:t>
+            </a:r>
+          </a:p>
+          <a:p>
+            <a:pPr lvl="1"/>
+            <a:r>
+              <a:rPr lang="en-US" dirty="0"/>
+              <a:t>Smallest minimum member size with &lt;30 minute runtime was 6 mm</a:t>
+            </a:r>
+          </a:p>
+          <a:p>
+            <a:pPr lvl="1"/>
+            <a:r>
+              <a:rPr lang="en-US" dirty="0"/>
+              <a:t>For the first product optimization I attempted—the shelf shown to the right—the actual shelf had 1/16 in. diameter members, but the smallest possible member size in Inspire was 1/3 in., and increased to 1 in. to reduce runtime below 30 minutes</a:t>
+            </a:r>
+          </a:p>
+        </p:txBody>
+      </p:sp>
+      <p:sp>
+        <p:nvSpPr>
+          <p:cNvPr id="4" name="Rectangle 3">
+            <a:extLst>
+              <a:ext uri="{FF2B5EF4-FFF2-40B4-BE49-F238E27FC236}">
+                <a16:creationId xmlns:a16="http://schemas.microsoft.com/office/drawing/2014/main" id="{7ECD20E5-AF9A-FA4C-BE5C-730CD0B776D9}"/>
+              </a:ext>
+            </a:extLst>
+          </p:cNvPr>
+          <p:cNvSpPr/>
+          <p:nvPr/>
+        </p:nvSpPr>
+        <p:spPr>
+          <a:xfrm>
+            <a:off x="6641738" y="1011981"/>
+            <a:ext cx="4513942" cy="1219200"/>
+          </a:xfrm>
+          <a:prstGeom prst="rect">
+            <a:avLst/>
+          </a:prstGeom>
+          <a:ln>
+            <a:noFill/>
+          </a:ln>
+        </p:spPr>
+        <p:style>
+          <a:lnRef idx="2">
+            <a:schemeClr val="accent6"/>
+          </a:lnRef>
+          <a:fillRef idx="1">
+            <a:schemeClr val="lt1"/>
+          </a:fillRef>
+          <a:effectRef idx="0">
+            <a:schemeClr val="accent6"/>
+          </a:effectRef>
+          <a:fontRef idx="minor">
+            <a:schemeClr val="dk1"/>
+          </a:fontRef>
+        </p:style>
+        <p:txBody>
+          <a:bodyPr rtlCol="0" anchor="ctr"/>
+          <a:lstStyle/>
+          <a:p>
+            <a:pPr algn="ctr"/>
+            <a:endParaRPr lang="en-US"/>
+          </a:p>
+        </p:txBody>
+      </p:sp>
+      <p:pic>
+        <p:nvPicPr>
+          <p:cNvPr id="6" name="Picture 5">
+            <a:extLst>
+              <a:ext uri="{FF2B5EF4-FFF2-40B4-BE49-F238E27FC236}">
+                <a16:creationId xmlns:a16="http://schemas.microsoft.com/office/drawing/2014/main" id="{D6716514-3E98-8940-8011-F15270B00E8E}"/>
+              </a:ext>
+            </a:extLst>
+          </p:cNvPr>
+          <p:cNvPicPr>
+            <a:picLocks noChangeAspect="1"/>
+          </p:cNvPicPr>
+          <p:nvPr/>
+        </p:nvPicPr>
+        <p:blipFill rotWithShape="1">
+          <a:blip r:embed="rId2">
+            <a:extLst>
+              <a:ext uri="{28A0092B-C50C-407E-A947-70E740481C1C}">
+                <a14:useLocalDpi xmlns:a14="http://schemas.microsoft.com/office/drawing/2010/main" val="0"/>
+              </a:ext>
+            </a:extLst>
+          </a:blip>
+          <a:srcRect t="43363"/>
+          <a:stretch/>
+        </p:blipFill>
+        <p:spPr>
+          <a:xfrm>
+            <a:off x="7085616" y="245582"/>
+            <a:ext cx="2618997" cy="1977763"/>
+          </a:xfrm>
+          <a:prstGeom prst="rect">
+            <a:avLst/>
+          </a:prstGeom>
+        </p:spPr>
+      </p:pic>
+      <p:pic>
+        <p:nvPicPr>
+          <p:cNvPr id="8" name="Picture 7">
+            <a:extLst>
+              <a:ext uri="{FF2B5EF4-FFF2-40B4-BE49-F238E27FC236}">
+                <a16:creationId xmlns:a16="http://schemas.microsoft.com/office/drawing/2014/main" id="{B7F3F4F3-5532-BC4A-8404-5122E12A4245}"/>
+              </a:ext>
+            </a:extLst>
+          </p:cNvPr>
+          <p:cNvPicPr>
+            <a:picLocks noChangeAspect="1"/>
+          </p:cNvPicPr>
+          <p:nvPr/>
+        </p:nvPicPr>
+        <p:blipFill>
+          <a:blip r:embed="rId3">
+            <a:extLst>
+              <a:ext uri="{28A0092B-C50C-407E-A947-70E740481C1C}">
+                <a14:useLocalDpi xmlns:a14="http://schemas.microsoft.com/office/drawing/2010/main" val="0"/>
+              </a:ext>
+            </a:extLst>
+          </a:blip>
+          <a:stretch>
+            <a:fillRect/>
+          </a:stretch>
+        </p:blipFill>
+        <p:spPr>
+          <a:xfrm>
+            <a:off x="9757228" y="1937657"/>
+            <a:ext cx="2319867" cy="2982686"/>
+          </a:xfrm>
+          <a:prstGeom prst="rect">
+            <a:avLst/>
+          </a:prstGeom>
+        </p:spPr>
+      </p:pic>
+      <p:pic>
+        <p:nvPicPr>
+          <p:cNvPr id="10" name="Picture 9">
+            <a:extLst>
+              <a:ext uri="{FF2B5EF4-FFF2-40B4-BE49-F238E27FC236}">
+                <a16:creationId xmlns:a16="http://schemas.microsoft.com/office/drawing/2014/main" id="{00033092-3409-5644-8964-D6C0AEA727E4}"/>
+              </a:ext>
+            </a:extLst>
+          </p:cNvPr>
+          <p:cNvPicPr>
+            <a:picLocks noChangeAspect="1"/>
+          </p:cNvPicPr>
+          <p:nvPr/>
+        </p:nvPicPr>
+        <p:blipFill>
+          <a:blip r:embed="rId4">
+            <a:extLst>
+              <a:ext uri="{28A0092B-C50C-407E-A947-70E740481C1C}">
+                <a14:useLocalDpi xmlns:a14="http://schemas.microsoft.com/office/drawing/2010/main" val="0"/>
+              </a:ext>
+            </a:extLst>
+          </a:blip>
+          <a:stretch>
+            <a:fillRect/>
+          </a:stretch>
+        </p:blipFill>
+        <p:spPr>
+          <a:xfrm>
+            <a:off x="7085616" y="2763854"/>
+            <a:ext cx="2618998" cy="3248946"/>
+          </a:xfrm>
+          <a:prstGeom prst="rect">
+            <a:avLst/>
+          </a:prstGeom>
+        </p:spPr>
+      </p:pic>
+      <p:sp>
+        <p:nvSpPr>
+          <p:cNvPr id="11" name="Bent-Up Arrow 10">
+            <a:extLst>
+              <a:ext uri="{FF2B5EF4-FFF2-40B4-BE49-F238E27FC236}">
+                <a16:creationId xmlns:a16="http://schemas.microsoft.com/office/drawing/2014/main" id="{26B9F0C0-9854-0146-B8A5-94749DB824D9}"/>
+              </a:ext>
+            </a:extLst>
+          </p:cNvPr>
+          <p:cNvSpPr/>
+          <p:nvPr/>
+        </p:nvSpPr>
+        <p:spPr>
+          <a:xfrm flipV="1">
+            <a:off x="10148491" y="864317"/>
+            <a:ext cx="928915" cy="895195"/>
+          </a:xfrm>
+          <a:prstGeom prst="bentUpArrow">
+            <a:avLst/>
+          </a:prstGeom>
+        </p:spPr>
+        <p:style>
+          <a:lnRef idx="2">
+            <a:schemeClr val="accent1">
+              <a:shade val="50000"/>
+            </a:schemeClr>
+          </a:lnRef>
+          <a:fillRef idx="1">
+            <a:schemeClr val="accent1"/>
+          </a:fillRef>
+          <a:effectRef idx="0">
+            <a:schemeClr val="accent1"/>
+          </a:effectRef>
+          <a:fontRef idx="minor">
+            <a:schemeClr val="lt1"/>
+          </a:fontRef>
+        </p:style>
+        <p:txBody>
+          <a:bodyPr rtlCol="0" anchor="ctr"/>
+          <a:lstStyle/>
+          <a:p>
+            <a:pPr algn="ctr"/>
+            <a:endParaRPr lang="en-US"/>
+          </a:p>
+        </p:txBody>
+      </p:sp>
+      <p:sp>
+        <p:nvSpPr>
+          <p:cNvPr id="12" name="Bent-Up Arrow 11">
+            <a:extLst>
+              <a:ext uri="{FF2B5EF4-FFF2-40B4-BE49-F238E27FC236}">
+                <a16:creationId xmlns:a16="http://schemas.microsoft.com/office/drawing/2014/main" id="{D65EEC35-C7F6-9347-A965-C42AB455A052}"/>
+              </a:ext>
+            </a:extLst>
+          </p:cNvPr>
+          <p:cNvSpPr/>
+          <p:nvPr/>
+        </p:nvSpPr>
+        <p:spPr>
+          <a:xfrm rot="5400000" flipV="1">
+            <a:off x="10005106" y="5011858"/>
+            <a:ext cx="928915" cy="895195"/>
+          </a:xfrm>
+          <a:prstGeom prst="bentUpArrow">
+            <a:avLst/>
+          </a:prstGeom>
+        </p:spPr>
+        <p:style>
+          <a:lnRef idx="2">
+            <a:schemeClr val="accent1">
+              <a:shade val="50000"/>
+            </a:schemeClr>
+          </a:lnRef>
+          <a:fillRef idx="1">
+            <a:schemeClr val="accent1"/>
+          </a:fillRef>
+          <a:effectRef idx="0">
+            <a:schemeClr val="accent1"/>
+          </a:effectRef>
+          <a:fontRef idx="minor">
+            <a:schemeClr val="lt1"/>
+          </a:fontRef>
+        </p:style>
+        <p:txBody>
+          <a:bodyPr rtlCol="0" anchor="ctr"/>
+          <a:lstStyle/>
+          <a:p>
+            <a:pPr algn="ctr"/>
+            <a:endParaRPr lang="en-US"/>
+          </a:p>
+        </p:txBody>
+      </p:sp>
+    </p:spTree>
+    <p:extLst>
+      <p:ext uri="{BB962C8B-B14F-4D97-AF65-F5344CB8AC3E}">
+        <p14:creationId xmlns:p14="http://schemas.microsoft.com/office/powerpoint/2010/main" val="1494672888"/>
+      </p:ext>
+    </p:extLst>
+  </p:cSld>
+  <p:clrMapOvr>
+    <a:masterClrMapping/>
+  </p:clrMapOvr>
+</p:sld>
+</file>
+
+<file path=ppt/slides/slide7.xml><?xml version="1.0" encoding="utf-8"?>
+<p:sld xmlns:a="http://schemas.openxmlformats.org/drawingml/2006/main" xmlns:r="http://schemas.openxmlformats.org/officeDocument/2006/relationships" xmlns:p="http://schemas.openxmlformats.org/presentationml/2006/main">
+  <p:cSld>
+    <p:spTree>
+      <p:nvGrpSpPr>
+        <p:cNvPr id="1" name=""/>
+        <p:cNvGrpSpPr/>
+        <p:nvPr/>
+      </p:nvGrpSpPr>
+      <p:grpSpPr>
+        <a:xfrm>
+          <a:off x="0" y="0"/>
+          <a:ext cx="0" cy="0"/>
+          <a:chOff x="0" y="0"/>
+          <a:chExt cx="0" cy="0"/>
+        </a:xfrm>
+      </p:grpSpPr>
+      <p:sp>
+        <p:nvSpPr>
+          <p:cNvPr id="2" name="Title 1"/>
+          <p:cNvSpPr>
+            <a:spLocks noGrp="1"/>
+          </p:cNvSpPr>
+          <p:nvPr>
+            <p:ph type="title"/>
+          </p:nvPr>
+        </p:nvSpPr>
         <p:spPr/>
         <p:txBody>
           <a:bodyPr/>
           <a:lstStyle/>
           <a:p>
             <a:r>
-              <a:rPr lang="en-US" dirty="0" smtClean="0"/>
-              <a:t>Inspire was not able to create a desirable design with the parameters given and the resources allocated</a:t>
-            </a:r>
-          </a:p>
-          <a:p>
-            <a:r>
-              <a:rPr lang="en-US" dirty="0" smtClean="0"/>
-              <a:t>For this type of an analysis, a more advanced knowledge of how to set up a design in Inspire would be required</a:t>
-            </a:r>
-            <a:endParaRPr lang="en-US" dirty="0"/>
+              <a:rPr lang="en-US" dirty="0"/>
+              <a:t>Discussion</a:t>
+            </a:r>
+          </a:p>
+        </p:txBody>
+      </p:sp>
+      <p:sp>
+        <p:nvSpPr>
+          <p:cNvPr id="3" name="Content Placeholder 2"/>
+          <p:cNvSpPr>
+            <a:spLocks noGrp="1"/>
+          </p:cNvSpPr>
+          <p:nvPr>
+            <p:ph idx="1"/>
+          </p:nvPr>
+        </p:nvSpPr>
+        <p:spPr/>
+        <p:txBody>
+          <a:bodyPr>
+            <a:normAutofit/>
+          </a:bodyPr>
+          <a:lstStyle/>
+          <a:p>
+            <a:r>
+              <a:rPr lang="en-US" dirty="0"/>
+              <a:t>The uniqueness of the shape determined depended heavily on the object being optimized</a:t>
+            </a:r>
+          </a:p>
+          <a:p>
+            <a:pPr lvl="1"/>
+            <a:r>
+              <a:rPr lang="en-US" dirty="0"/>
+              <a:t>Nearly all of the examples for Inspire use truss-like structures that seem to be easily optimized by the program</a:t>
+            </a:r>
+          </a:p>
+          <a:p>
+            <a:pPr lvl="1"/>
+            <a:r>
+              <a:rPr lang="en-US" dirty="0"/>
+              <a:t>For the robot chassis, the result for the turret tower was fairly innovative, yet the result for the base was slightly less so</a:t>
+            </a:r>
+          </a:p>
+          <a:p>
+            <a:pPr lvl="1"/>
+            <a:r>
+              <a:rPr lang="en-US" dirty="0"/>
+              <a:t>The design for the shelf was essentially a thinner shelf; the manufacturer’s wire-frame construction was more unique than </a:t>
+            </a:r>
+            <a:r>
+              <a:rPr lang="en-US" dirty="0" err="1"/>
+              <a:t>Inspire’s</a:t>
+            </a:r>
+            <a:r>
+              <a:rPr lang="en-US" dirty="0"/>
+              <a:t> result</a:t>
+            </a:r>
+          </a:p>
+          <a:p>
+            <a:r>
+              <a:rPr lang="en-US" dirty="0"/>
+              <a:t>The results for the robot chassis could be significantly improved with more detail</a:t>
+            </a:r>
+          </a:p>
+          <a:p>
+            <a:pPr lvl="1"/>
+            <a:r>
+              <a:rPr lang="en-US" dirty="0"/>
+              <a:t>A more precise measurement of loads and their locations would likely improve the optimization results</a:t>
+            </a:r>
+          </a:p>
+          <a:p>
+            <a:pPr lvl="1"/>
+            <a:r>
+              <a:rPr lang="en-US" dirty="0"/>
+              <a:t>In some places where the optimization used the entire structure, such as the turret tower, a larger design space may result in a more optimal design</a:t>
+            </a:r>
+          </a:p>
+        </p:txBody>
+      </p:sp>
+    </p:spTree>
+    <p:extLst>
+      <p:ext uri="{BB962C8B-B14F-4D97-AF65-F5344CB8AC3E}">
+        <p14:creationId xmlns:p14="http://schemas.microsoft.com/office/powerpoint/2010/main" val="1426507555"/>
+      </p:ext>
+    </p:extLst>
+  </p:cSld>
+  <p:clrMapOvr>
+    <a:masterClrMapping/>
+  </p:clrMapOvr>
+</p:sld>
+</file>
+
+<file path=ppt/slides/slide8.xml><?xml version="1.0" encoding="utf-8"?>
+<p:sld xmlns:a="http://schemas.openxmlformats.org/drawingml/2006/main" xmlns:r="http://schemas.openxmlformats.org/officeDocument/2006/relationships" xmlns:p="http://schemas.openxmlformats.org/presentationml/2006/main">
+  <p:cSld>
+    <p:spTree>
+      <p:nvGrpSpPr>
+        <p:cNvPr id="1" name=""/>
+        <p:cNvGrpSpPr/>
+        <p:nvPr/>
+      </p:nvGrpSpPr>
+      <p:grpSpPr>
+        <a:xfrm>
+          <a:off x="0" y="0"/>
+          <a:ext cx="0" cy="0"/>
+          <a:chOff x="0" y="0"/>
+          <a:chExt cx="0" cy="0"/>
+        </a:xfrm>
+      </p:grpSpPr>
+      <p:sp>
+        <p:nvSpPr>
+          <p:cNvPr id="2" name="Title 1"/>
+          <p:cNvSpPr>
+            <a:spLocks noGrp="1"/>
+          </p:cNvSpPr>
+          <p:nvPr>
+            <p:ph type="title"/>
+          </p:nvPr>
+        </p:nvSpPr>
+        <p:spPr/>
+        <p:txBody>
+          <a:bodyPr/>
+          <a:lstStyle/>
+          <a:p>
+            <a:r>
+              <a:rPr lang="en-US" dirty="0"/>
+              <a:t>Conclusions</a:t>
+            </a:r>
+          </a:p>
+        </p:txBody>
+      </p:sp>
+      <p:sp>
+        <p:nvSpPr>
+          <p:cNvPr id="3" name="Content Placeholder 2"/>
+          <p:cNvSpPr>
+            <a:spLocks noGrp="1"/>
+          </p:cNvSpPr>
+          <p:nvPr>
+            <p:ph idx="1"/>
+          </p:nvPr>
+        </p:nvSpPr>
+        <p:spPr/>
+        <p:txBody>
+          <a:bodyPr/>
+          <a:lstStyle/>
+          <a:p>
+            <a:r>
+              <a:rPr lang="en-US" dirty="0"/>
+              <a:t>Inspire is an effective tool to be able to reduce mass, even with the difficulties with the minimize mass objective optimizations</a:t>
+            </a:r>
+          </a:p>
+          <a:p>
+            <a:r>
+              <a:rPr lang="en-US" dirty="0"/>
+              <a:t>Minimum member size and runtime are two of the greatest limiting factors of the software</a:t>
+            </a:r>
+          </a:p>
+          <a:p>
+            <a:r>
+              <a:rPr lang="en-US" dirty="0"/>
+              <a:t>Inspire is able to optimize some types of structures better than others</a:t>
+            </a:r>
+          </a:p>
+          <a:p>
+            <a:r>
+              <a:rPr lang="en-US" dirty="0"/>
+              <a:t>To truly optimize a design, a more advanced knowledge of how to set the design up is required, especially when it comes to isolating the best design space</a:t>
+            </a:r>
           </a:p>
         </p:txBody>
       </p:sp>

</xml_diff>